<commit_message>
Simplificamos los mapas conceptuales y el ppt para que tome menos tiempo
</commit_message>
<xml_diff>
--- a/Reorganizando datos con Tidyr.pptx
+++ b/Reorganizando datos con Tidyr.pptx
@@ -10,10 +10,8 @@
     <p:sldId id="260" r:id="rId4"/>
     <p:sldId id="266" r:id="rId5"/>
     <p:sldId id="275" r:id="rId6"/>
-    <p:sldId id="276" r:id="rId7"/>
-    <p:sldId id="274" r:id="rId8"/>
-    <p:sldId id="277" r:id="rId9"/>
-    <p:sldId id="273" r:id="rId10"/>
+    <p:sldId id="274" r:id="rId7"/>
+    <p:sldId id="273" r:id="rId8"/>
   </p:sldIdLst>
   <p:sldSz cx="12192000" cy="6858000"/>
   <p:notesSz cx="6858000" cy="9144000"/>
@@ -251,7 +249,7 @@
           <a:p>
             <a:fld id="{EA6801A3-DC05-48C9-B8F2-FBEABE15B8AD}" type="datetimeFigureOut">
               <a:rPr lang="es-AR" smtClean="0"/>
-              <a:t>10/5/2021</a:t>
+              <a:t>11/5/2021</a:t>
             </a:fld>
             <a:endParaRPr lang="es-AR"/>
           </a:p>
@@ -421,7 +419,7 @@
           <a:p>
             <a:fld id="{EA6801A3-DC05-48C9-B8F2-FBEABE15B8AD}" type="datetimeFigureOut">
               <a:rPr lang="es-AR" smtClean="0"/>
-              <a:t>10/5/2021</a:t>
+              <a:t>11/5/2021</a:t>
             </a:fld>
             <a:endParaRPr lang="es-AR"/>
           </a:p>
@@ -601,7 +599,7 @@
           <a:p>
             <a:fld id="{EA6801A3-DC05-48C9-B8F2-FBEABE15B8AD}" type="datetimeFigureOut">
               <a:rPr lang="es-AR" smtClean="0"/>
-              <a:t>10/5/2021</a:t>
+              <a:t>11/5/2021</a:t>
             </a:fld>
             <a:endParaRPr lang="es-AR"/>
           </a:p>
@@ -771,7 +769,7 @@
           <a:p>
             <a:fld id="{EA6801A3-DC05-48C9-B8F2-FBEABE15B8AD}" type="datetimeFigureOut">
               <a:rPr lang="es-AR" smtClean="0"/>
-              <a:t>10/5/2021</a:t>
+              <a:t>11/5/2021</a:t>
             </a:fld>
             <a:endParaRPr lang="es-AR"/>
           </a:p>
@@ -1017,7 +1015,7 @@
           <a:p>
             <a:fld id="{EA6801A3-DC05-48C9-B8F2-FBEABE15B8AD}" type="datetimeFigureOut">
               <a:rPr lang="es-AR" smtClean="0"/>
-              <a:t>10/5/2021</a:t>
+              <a:t>11/5/2021</a:t>
             </a:fld>
             <a:endParaRPr lang="es-AR"/>
           </a:p>
@@ -1249,7 +1247,7 @@
           <a:p>
             <a:fld id="{EA6801A3-DC05-48C9-B8F2-FBEABE15B8AD}" type="datetimeFigureOut">
               <a:rPr lang="es-AR" smtClean="0"/>
-              <a:t>10/5/2021</a:t>
+              <a:t>11/5/2021</a:t>
             </a:fld>
             <a:endParaRPr lang="es-AR"/>
           </a:p>
@@ -1616,7 +1614,7 @@
           <a:p>
             <a:fld id="{EA6801A3-DC05-48C9-B8F2-FBEABE15B8AD}" type="datetimeFigureOut">
               <a:rPr lang="es-AR" smtClean="0"/>
-              <a:t>10/5/2021</a:t>
+              <a:t>11/5/2021</a:t>
             </a:fld>
             <a:endParaRPr lang="es-AR"/>
           </a:p>
@@ -1734,7 +1732,7 @@
           <a:p>
             <a:fld id="{EA6801A3-DC05-48C9-B8F2-FBEABE15B8AD}" type="datetimeFigureOut">
               <a:rPr lang="es-AR" smtClean="0"/>
-              <a:t>10/5/2021</a:t>
+              <a:t>11/5/2021</a:t>
             </a:fld>
             <a:endParaRPr lang="es-AR"/>
           </a:p>
@@ -1829,7 +1827,7 @@
           <a:p>
             <a:fld id="{EA6801A3-DC05-48C9-B8F2-FBEABE15B8AD}" type="datetimeFigureOut">
               <a:rPr lang="es-AR" smtClean="0"/>
-              <a:t>10/5/2021</a:t>
+              <a:t>11/5/2021</a:t>
             </a:fld>
             <a:endParaRPr lang="es-AR"/>
           </a:p>
@@ -2106,7 +2104,7 @@
           <a:p>
             <a:fld id="{EA6801A3-DC05-48C9-B8F2-FBEABE15B8AD}" type="datetimeFigureOut">
               <a:rPr lang="es-AR" smtClean="0"/>
-              <a:t>10/5/2021</a:t>
+              <a:t>11/5/2021</a:t>
             </a:fld>
             <a:endParaRPr lang="es-AR"/>
           </a:p>
@@ -2359,7 +2357,7 @@
           <a:p>
             <a:fld id="{EA6801A3-DC05-48C9-B8F2-FBEABE15B8AD}" type="datetimeFigureOut">
               <a:rPr lang="es-AR" smtClean="0"/>
-              <a:t>10/5/2021</a:t>
+              <a:t>11/5/2021</a:t>
             </a:fld>
             <a:endParaRPr lang="es-AR"/>
           </a:p>
@@ -2572,7 +2570,7 @@
           <a:p>
             <a:fld id="{EA6801A3-DC05-48C9-B8F2-FBEABE15B8AD}" type="datetimeFigureOut">
               <a:rPr lang="es-AR" smtClean="0"/>
-              <a:t>10/5/2021</a:t>
+              <a:t>11/5/2021</a:t>
             </a:fld>
             <a:endParaRPr lang="es-AR"/>
           </a:p>
@@ -4010,191 +4008,6 @@
             <p:ph type="title"/>
           </p:nvPr>
         </p:nvSpPr>
-        <p:spPr/>
-        <p:txBody>
-          <a:bodyPr/>
-          <a:lstStyle/>
-          <a:p>
-            <a:r>
-              <a:rPr lang="en-US" u="sng" dirty="0" err="1">
-                <a:solidFill>
-                  <a:srgbClr val="0070C0"/>
-                </a:solidFill>
-              </a:rPr>
-              <a:t>Reorganizar</a:t>
-            </a:r>
-            <a:r>
-              <a:rPr lang="en-US" u="sng" dirty="0">
-                <a:solidFill>
-                  <a:srgbClr val="0070C0"/>
-                </a:solidFill>
-              </a:rPr>
-              <a:t> </a:t>
-            </a:r>
-            <a:r>
-              <a:rPr lang="en-US" u="sng" dirty="0" err="1">
-                <a:solidFill>
-                  <a:srgbClr val="0070C0"/>
-                </a:solidFill>
-              </a:rPr>
-              <a:t>datos</a:t>
-            </a:r>
-            <a:r>
-              <a:rPr lang="en-US" u="sng" dirty="0">
-                <a:solidFill>
-                  <a:srgbClr val="0070C0"/>
-                </a:solidFill>
-              </a:rPr>
-              <a:t> con </a:t>
-            </a:r>
-            <a:r>
-              <a:rPr lang="en-US" u="sng" dirty="0" err="1">
-                <a:solidFill>
-                  <a:srgbClr val="0070C0"/>
-                </a:solidFill>
-              </a:rPr>
-              <a:t>tidyr</a:t>
-            </a:r>
-            <a:endParaRPr lang="es-AR" dirty="0"/>
-          </a:p>
-        </p:txBody>
-      </p:sp>
-      <p:pic>
-        <p:nvPicPr>
-          <p:cNvPr id="4" name="Picture 3"/>
-          <p:cNvPicPr>
-            <a:picLocks noChangeAspect="1"/>
-          </p:cNvPicPr>
-          <p:nvPr/>
-        </p:nvPicPr>
-        <p:blipFill>
-          <a:blip r:embed="rId2"/>
-          <a:stretch>
-            <a:fillRect/>
-          </a:stretch>
-        </p:blipFill>
-        <p:spPr>
-          <a:xfrm>
-            <a:off x="3114675" y="1690688"/>
-            <a:ext cx="6591300" cy="4706214"/>
-          </a:xfrm>
-          <a:prstGeom prst="rect">
-            <a:avLst/>
-          </a:prstGeom>
-        </p:spPr>
-      </p:pic>
-      <p:pic>
-        <p:nvPicPr>
-          <p:cNvPr id="6" name="Picture 5"/>
-          <p:cNvPicPr>
-            <a:picLocks noChangeAspect="1"/>
-          </p:cNvPicPr>
-          <p:nvPr/>
-        </p:nvPicPr>
-        <p:blipFill>
-          <a:blip r:embed="rId3"/>
-          <a:stretch>
-            <a:fillRect/>
-          </a:stretch>
-        </p:blipFill>
-        <p:spPr>
-          <a:xfrm>
-            <a:off x="838200" y="1266587"/>
-            <a:ext cx="3164098" cy="963251"/>
-          </a:xfrm>
-          <a:prstGeom prst="rect">
-            <a:avLst/>
-          </a:prstGeom>
-        </p:spPr>
-      </p:pic>
-      <p:pic>
-        <p:nvPicPr>
-          <p:cNvPr id="8" name="Picture 7"/>
-          <p:cNvPicPr>
-            <a:picLocks noChangeAspect="1"/>
-          </p:cNvPicPr>
-          <p:nvPr/>
-        </p:nvPicPr>
-        <p:blipFill>
-          <a:blip r:embed="rId4"/>
-          <a:stretch>
-            <a:fillRect/>
-          </a:stretch>
-        </p:blipFill>
-        <p:spPr>
-          <a:xfrm>
-            <a:off x="8834437" y="1748212"/>
-            <a:ext cx="871538" cy="1054911"/>
-          </a:xfrm>
-          <a:prstGeom prst="rect">
-            <a:avLst/>
-          </a:prstGeom>
-        </p:spPr>
-      </p:pic>
-      <p:pic>
-        <p:nvPicPr>
-          <p:cNvPr id="9" name="Picture 8"/>
-          <p:cNvPicPr>
-            <a:picLocks noChangeAspect="1"/>
-          </p:cNvPicPr>
-          <p:nvPr/>
-        </p:nvPicPr>
-        <p:blipFill>
-          <a:blip r:embed="rId5"/>
-          <a:stretch>
-            <a:fillRect/>
-          </a:stretch>
-        </p:blipFill>
-        <p:spPr>
-          <a:xfrm>
-            <a:off x="8700631" y="5139112"/>
-            <a:ext cx="1005344" cy="1056119"/>
-          </a:xfrm>
-          <a:prstGeom prst="rect">
-            <a:avLst/>
-          </a:prstGeom>
-        </p:spPr>
-      </p:pic>
-    </p:spTree>
-    <p:extLst>
-      <p:ext uri="{BB962C8B-B14F-4D97-AF65-F5344CB8AC3E}">
-        <p14:creationId xmlns:p14="http://schemas.microsoft.com/office/powerpoint/2010/main" val="4046802152"/>
-      </p:ext>
-    </p:extLst>
-  </p:cSld>
-  <p:clrMapOvr>
-    <a:masterClrMapping/>
-  </p:clrMapOvr>
-</p:sld>
-</file>
-
-<file path=ppt/slides/slide7.xml><?xml version="1.0" encoding="utf-8"?>
-<p:sld xmlns:a="http://schemas.openxmlformats.org/drawingml/2006/main" xmlns:r="http://schemas.openxmlformats.org/officeDocument/2006/relationships" xmlns:p="http://schemas.openxmlformats.org/presentationml/2006/main">
-  <p:cSld>
-    <p:spTree>
-      <p:nvGrpSpPr>
-        <p:cNvPr id="1" name=""/>
-        <p:cNvGrpSpPr/>
-        <p:nvPr/>
-      </p:nvGrpSpPr>
-      <p:grpSpPr>
-        <a:xfrm>
-          <a:off x="0" y="0"/>
-          <a:ext cx="0" cy="0"/>
-          <a:chOff x="0" y="0"/>
-          <a:chExt cx="0" cy="0"/>
-        </a:xfrm>
-      </p:grpSpPr>
-      <p:sp>
-        <p:nvSpPr>
-          <p:cNvPr id="2" name="Title 1"/>
-          <p:cNvSpPr>
-            <a:spLocks noGrp="1"/>
-          </p:cNvSpPr>
-          <p:nvPr>
-            <p:ph type="title"/>
-          </p:nvPr>
-        </p:nvSpPr>
         <p:spPr>
           <a:xfrm>
             <a:off x="838200" y="318943"/>
@@ -4445,211 +4258,7 @@
 </p:sld>
 </file>
 
-<file path=ppt/slides/slide8.xml><?xml version="1.0" encoding="utf-8"?>
-<p:sld xmlns:a="http://schemas.openxmlformats.org/drawingml/2006/main" xmlns:r="http://schemas.openxmlformats.org/officeDocument/2006/relationships" xmlns:p="http://schemas.openxmlformats.org/presentationml/2006/main">
-  <p:cSld>
-    <p:spTree>
-      <p:nvGrpSpPr>
-        <p:cNvPr id="1" name=""/>
-        <p:cNvGrpSpPr/>
-        <p:nvPr/>
-      </p:nvGrpSpPr>
-      <p:grpSpPr>
-        <a:xfrm>
-          <a:off x="0" y="0"/>
-          <a:ext cx="0" cy="0"/>
-          <a:chOff x="0" y="0"/>
-          <a:chExt cx="0" cy="0"/>
-        </a:xfrm>
-      </p:grpSpPr>
-      <p:sp>
-        <p:nvSpPr>
-          <p:cNvPr id="2" name="Title 1"/>
-          <p:cNvSpPr>
-            <a:spLocks noGrp="1"/>
-          </p:cNvSpPr>
-          <p:nvPr>
-            <p:ph type="title"/>
-          </p:nvPr>
-        </p:nvSpPr>
-        <p:spPr/>
-        <p:txBody>
-          <a:bodyPr/>
-          <a:lstStyle/>
-          <a:p>
-            <a:r>
-              <a:rPr lang="en-US" u="sng" dirty="0" err="1">
-                <a:solidFill>
-                  <a:srgbClr val="0070C0"/>
-                </a:solidFill>
-              </a:rPr>
-              <a:t>Reorganizando</a:t>
-            </a:r>
-            <a:r>
-              <a:rPr lang="en-US" u="sng" dirty="0">
-                <a:solidFill>
-                  <a:srgbClr val="0070C0"/>
-                </a:solidFill>
-              </a:rPr>
-              <a:t> </a:t>
-            </a:r>
-            <a:r>
-              <a:rPr lang="en-US" u="sng" dirty="0" err="1">
-                <a:solidFill>
-                  <a:srgbClr val="0070C0"/>
-                </a:solidFill>
-              </a:rPr>
-              <a:t>datos</a:t>
-            </a:r>
-            <a:r>
-              <a:rPr lang="en-US" u="sng" dirty="0">
-                <a:solidFill>
-                  <a:srgbClr val="0070C0"/>
-                </a:solidFill>
-              </a:rPr>
-              <a:t> con </a:t>
-            </a:r>
-            <a:r>
-              <a:rPr lang="en-US" u="sng" dirty="0" err="1">
-                <a:solidFill>
-                  <a:srgbClr val="0070C0"/>
-                </a:solidFill>
-              </a:rPr>
-              <a:t>tidyr</a:t>
-            </a:r>
-            <a:r>
-              <a:rPr lang="es-AR" dirty="0"/>
-              <a:t/>
-            </a:r>
-            <a:br>
-              <a:rPr lang="es-AR" dirty="0"/>
-            </a:br>
-            <a:endParaRPr lang="es-AR" dirty="0"/>
-          </a:p>
-        </p:txBody>
-      </p:sp>
-      <p:pic>
-        <p:nvPicPr>
-          <p:cNvPr id="5" name="Content Placeholder 4"/>
-          <p:cNvPicPr>
-            <a:picLocks noGrp="1" noChangeAspect="1"/>
-          </p:cNvPicPr>
-          <p:nvPr>
-            <p:ph idx="1"/>
-          </p:nvPr>
-        </p:nvPicPr>
-        <p:blipFill>
-          <a:blip r:embed="rId2"/>
-          <a:stretch>
-            <a:fillRect/>
-          </a:stretch>
-        </p:blipFill>
-        <p:spPr>
-          <a:xfrm>
-            <a:off x="2941105" y="1295248"/>
-            <a:ext cx="7060145" cy="5353700"/>
-          </a:xfrm>
-          <a:prstGeom prst="rect">
-            <a:avLst/>
-          </a:prstGeom>
-        </p:spPr>
-      </p:pic>
-      <p:sp>
-        <p:nvSpPr>
-          <p:cNvPr id="6" name="TextBox 5"/>
-          <p:cNvSpPr txBox="1"/>
-          <p:nvPr/>
-        </p:nvSpPr>
-        <p:spPr>
-          <a:xfrm>
-            <a:off x="428625" y="1295248"/>
-            <a:ext cx="3085235" cy="646331"/>
-          </a:xfrm>
-          <a:prstGeom prst="rect">
-            <a:avLst/>
-          </a:prstGeom>
-          <a:noFill/>
-        </p:spPr>
-        <p:txBody>
-          <a:bodyPr wrap="square" rtlCol="0">
-            <a:spAutoFit/>
-          </a:bodyPr>
-          <a:lstStyle/>
-          <a:p>
-            <a:r>
-              <a:rPr lang="en-US" sz="3600" b="1" dirty="0" smtClean="0"/>
-              <a:t>    </a:t>
-            </a:r>
-            <a:r>
-              <a:rPr lang="en-US" sz="3600" b="1" dirty="0" err="1" smtClean="0"/>
-              <a:t>pivot_wider</a:t>
-            </a:r>
-            <a:endParaRPr lang="es-AR" sz="3600" b="1" dirty="0"/>
-          </a:p>
-        </p:txBody>
-      </p:sp>
-      <p:pic>
-        <p:nvPicPr>
-          <p:cNvPr id="7" name="Picture 6"/>
-          <p:cNvPicPr>
-            <a:picLocks noChangeAspect="1"/>
-          </p:cNvPicPr>
-          <p:nvPr/>
-        </p:nvPicPr>
-        <p:blipFill>
-          <a:blip r:embed="rId3"/>
-          <a:stretch>
-            <a:fillRect/>
-          </a:stretch>
-        </p:blipFill>
-        <p:spPr>
-          <a:xfrm>
-            <a:off x="5450248" y="1565900"/>
-            <a:ext cx="871538" cy="1054911"/>
-          </a:xfrm>
-          <a:prstGeom prst="rect">
-            <a:avLst/>
-          </a:prstGeom>
-        </p:spPr>
-      </p:pic>
-      <p:pic>
-        <p:nvPicPr>
-          <p:cNvPr id="8" name="Picture 7"/>
-          <p:cNvPicPr>
-            <a:picLocks noChangeAspect="1"/>
-          </p:cNvPicPr>
-          <p:nvPr/>
-        </p:nvPicPr>
-        <p:blipFill>
-          <a:blip r:embed="rId4"/>
-          <a:stretch>
-            <a:fillRect/>
-          </a:stretch>
-        </p:blipFill>
-        <p:spPr>
-          <a:xfrm>
-            <a:off x="1680706" y="5501062"/>
-            <a:ext cx="1005344" cy="1056119"/>
-          </a:xfrm>
-          <a:prstGeom prst="rect">
-            <a:avLst/>
-          </a:prstGeom>
-        </p:spPr>
-      </p:pic>
-    </p:spTree>
-    <p:extLst>
-      <p:ext uri="{BB962C8B-B14F-4D97-AF65-F5344CB8AC3E}">
-        <p14:creationId xmlns:p14="http://schemas.microsoft.com/office/powerpoint/2010/main" val="2576649066"/>
-      </p:ext>
-    </p:extLst>
-  </p:cSld>
-  <p:clrMapOvr>
-    <a:masterClrMapping/>
-  </p:clrMapOvr>
-</p:sld>
-</file>
-
-<file path=ppt/slides/slide9.xml><?xml version="1.0" encoding="utf-8"?>
+<file path=ppt/slides/slide7.xml><?xml version="1.0" encoding="utf-8"?>
 <p:sld xmlns:a="http://schemas.openxmlformats.org/drawingml/2006/main" xmlns:r="http://schemas.openxmlformats.org/officeDocument/2006/relationships" xmlns:p="http://schemas.openxmlformats.org/presentationml/2006/main">
   <p:cSld>
     <p:spTree>

</xml_diff>